<commit_message>
ppt sidang Signed-off-by: IKA RA <pujakusumae@hotmail.com>
</commit_message>
<xml_diff>
--- a/DOC/PROGRES/enam.pptx
+++ b/DOC/PROGRES/enam.pptx
@@ -332,7 +332,7 @@
           <a:p>
             <a:fld id="{D203A8CD-A426-4CB7-9842-D6FCE8C81E59}" type="datetimeFigureOut">
               <a:rPr lang="en-ID" smtClean="0"/>
-              <a:t>13/01/2021</a:t>
+              <a:t>02/02/2021</a:t>
             </a:fld>
             <a:endParaRPr lang="en-ID"/>
           </a:p>
@@ -553,7 +553,7 @@
           <a:p>
             <a:fld id="{D203A8CD-A426-4CB7-9842-D6FCE8C81E59}" type="datetimeFigureOut">
               <a:rPr lang="en-ID" smtClean="0"/>
-              <a:t>13/01/2021</a:t>
+              <a:t>02/02/2021</a:t>
             </a:fld>
             <a:endParaRPr lang="en-ID"/>
           </a:p>
@@ -733,7 +733,7 @@
           <a:p>
             <a:fld id="{D203A8CD-A426-4CB7-9842-D6FCE8C81E59}" type="datetimeFigureOut">
               <a:rPr lang="en-ID" smtClean="0"/>
-              <a:t>13/01/2021</a:t>
+              <a:t>02/02/2021</a:t>
             </a:fld>
             <a:endParaRPr lang="en-ID"/>
           </a:p>
@@ -903,7 +903,7 @@
           <a:p>
             <a:fld id="{D203A8CD-A426-4CB7-9842-D6FCE8C81E59}" type="datetimeFigureOut">
               <a:rPr lang="en-ID" smtClean="0"/>
-              <a:t>13/01/2021</a:t>
+              <a:t>02/02/2021</a:t>
             </a:fld>
             <a:endParaRPr lang="en-ID"/>
           </a:p>
@@ -1154,7 +1154,7 @@
           <a:p>
             <a:fld id="{D203A8CD-A426-4CB7-9842-D6FCE8C81E59}" type="datetimeFigureOut">
               <a:rPr lang="en-ID" smtClean="0"/>
-              <a:t>13/01/2021</a:t>
+              <a:t>02/02/2021</a:t>
             </a:fld>
             <a:endParaRPr lang="en-ID"/>
           </a:p>
@@ -1477,7 +1477,7 @@
           <a:p>
             <a:fld id="{D203A8CD-A426-4CB7-9842-D6FCE8C81E59}" type="datetimeFigureOut">
               <a:rPr lang="en-ID" smtClean="0"/>
-              <a:t>13/01/2021</a:t>
+              <a:t>02/02/2021</a:t>
             </a:fld>
             <a:endParaRPr lang="en-ID"/>
           </a:p>
@@ -1901,7 +1901,7 @@
           <a:p>
             <a:fld id="{D203A8CD-A426-4CB7-9842-D6FCE8C81E59}" type="datetimeFigureOut">
               <a:rPr lang="en-ID" smtClean="0"/>
-              <a:t>13/01/2021</a:t>
+              <a:t>02/02/2021</a:t>
             </a:fld>
             <a:endParaRPr lang="en-ID"/>
           </a:p>
@@ -2019,7 +2019,7 @@
           <a:p>
             <a:fld id="{D203A8CD-A426-4CB7-9842-D6FCE8C81E59}" type="datetimeFigureOut">
               <a:rPr lang="en-ID" smtClean="0"/>
-              <a:t>13/01/2021</a:t>
+              <a:t>02/02/2021</a:t>
             </a:fld>
             <a:endParaRPr lang="en-ID"/>
           </a:p>
@@ -2114,7 +2114,7 @@
           <a:p>
             <a:fld id="{D203A8CD-A426-4CB7-9842-D6FCE8C81E59}" type="datetimeFigureOut">
               <a:rPr lang="en-ID" smtClean="0"/>
-              <a:t>13/01/2021</a:t>
+              <a:t>02/02/2021</a:t>
             </a:fld>
             <a:endParaRPr lang="en-ID"/>
           </a:p>
@@ -2404,7 +2404,7 @@
           <a:p>
             <a:fld id="{D203A8CD-A426-4CB7-9842-D6FCE8C81E59}" type="datetimeFigureOut">
               <a:rPr lang="en-ID" smtClean="0"/>
-              <a:t>13/01/2021</a:t>
+              <a:t>02/02/2021</a:t>
             </a:fld>
             <a:endParaRPr lang="en-ID"/>
           </a:p>
@@ -2676,7 +2676,7 @@
           <a:p>
             <a:fld id="{D203A8CD-A426-4CB7-9842-D6FCE8C81E59}" type="datetimeFigureOut">
               <a:rPr lang="en-ID" smtClean="0"/>
-              <a:t>13/01/2021</a:t>
+              <a:t>02/02/2021</a:t>
             </a:fld>
             <a:endParaRPr lang="en-ID"/>
           </a:p>
@@ -2930,7 +2930,7 @@
           <a:p>
             <a:fld id="{D203A8CD-A426-4CB7-9842-D6FCE8C81E59}" type="datetimeFigureOut">
               <a:rPr lang="en-ID" smtClean="0"/>
-              <a:t>13/01/2021</a:t>
+              <a:t>02/02/2021</a:t>
             </a:fld>
             <a:endParaRPr lang="en-ID"/>
           </a:p>
@@ -15334,7 +15334,12 @@
             <p:ph type="title"/>
           </p:nvPr>
         </p:nvSpPr>
-        <p:spPr/>
+        <p:spPr>
+          <a:xfrm>
+            <a:off x="907473" y="360007"/>
+            <a:ext cx="9875520" cy="1356360"/>
+          </a:xfrm>
+        </p:spPr>
         <p:txBody>
           <a:bodyPr/>
           <a:lstStyle/>
@@ -17642,7 +17647,7 @@
         </p:blipFill>
         <p:spPr>
           <a:xfrm>
-            <a:off x="261726" y="1868556"/>
+            <a:off x="369796" y="1494484"/>
             <a:ext cx="7482966" cy="3500082"/>
           </a:xfrm>
           <a:prstGeom prst="rect">

</xml_diff>